<commit_message>
Adding a note about GraphQL
</commit_message>
<xml_diff>
--- a/WhatToDoInFrontBackAndDB_usability_performance_security/What to check where in full-stack.pptx
+++ b/WhatToDoInFrontBackAndDB_usability_performance_security/What to check where in full-stack.pptx
@@ -267,7 +267,7 @@
           <a:p>
             <a:fld id="{96965028-2F9E-4787-8FE0-280D7A46F03C}" type="datetimeFigureOut">
               <a:rPr lang="fi-FI" smtClean="0"/>
-              <a:t>1.10.2019</a:t>
+              <a:t>21.10.2019</a:t>
             </a:fld>
             <a:endParaRPr lang="fi-FI"/>
           </a:p>
@@ -467,7 +467,7 @@
           <a:p>
             <a:fld id="{96965028-2F9E-4787-8FE0-280D7A46F03C}" type="datetimeFigureOut">
               <a:rPr lang="fi-FI" smtClean="0"/>
-              <a:t>1.10.2019</a:t>
+              <a:t>21.10.2019</a:t>
             </a:fld>
             <a:endParaRPr lang="fi-FI"/>
           </a:p>
@@ -677,7 +677,7 @@
           <a:p>
             <a:fld id="{96965028-2F9E-4787-8FE0-280D7A46F03C}" type="datetimeFigureOut">
               <a:rPr lang="fi-FI" smtClean="0"/>
-              <a:t>1.10.2019</a:t>
+              <a:t>21.10.2019</a:t>
             </a:fld>
             <a:endParaRPr lang="fi-FI"/>
           </a:p>
@@ -877,7 +877,7 @@
           <a:p>
             <a:fld id="{96965028-2F9E-4787-8FE0-280D7A46F03C}" type="datetimeFigureOut">
               <a:rPr lang="fi-FI" smtClean="0"/>
-              <a:t>1.10.2019</a:t>
+              <a:t>21.10.2019</a:t>
             </a:fld>
             <a:endParaRPr lang="fi-FI"/>
           </a:p>
@@ -1153,7 +1153,7 @@
           <a:p>
             <a:fld id="{96965028-2F9E-4787-8FE0-280D7A46F03C}" type="datetimeFigureOut">
               <a:rPr lang="fi-FI" smtClean="0"/>
-              <a:t>1.10.2019</a:t>
+              <a:t>21.10.2019</a:t>
             </a:fld>
             <a:endParaRPr lang="fi-FI"/>
           </a:p>
@@ -1421,7 +1421,7 @@
           <a:p>
             <a:fld id="{96965028-2F9E-4787-8FE0-280D7A46F03C}" type="datetimeFigureOut">
               <a:rPr lang="fi-FI" smtClean="0"/>
-              <a:t>1.10.2019</a:t>
+              <a:t>21.10.2019</a:t>
             </a:fld>
             <a:endParaRPr lang="fi-FI"/>
           </a:p>
@@ -1836,7 +1836,7 @@
           <a:p>
             <a:fld id="{96965028-2F9E-4787-8FE0-280D7A46F03C}" type="datetimeFigureOut">
               <a:rPr lang="fi-FI" smtClean="0"/>
-              <a:t>1.10.2019</a:t>
+              <a:t>21.10.2019</a:t>
             </a:fld>
             <a:endParaRPr lang="fi-FI"/>
           </a:p>
@@ -1978,7 +1978,7 @@
           <a:p>
             <a:fld id="{96965028-2F9E-4787-8FE0-280D7A46F03C}" type="datetimeFigureOut">
               <a:rPr lang="fi-FI" smtClean="0"/>
-              <a:t>1.10.2019</a:t>
+              <a:t>21.10.2019</a:t>
             </a:fld>
             <a:endParaRPr lang="fi-FI"/>
           </a:p>
@@ -2091,7 +2091,7 @@
           <a:p>
             <a:fld id="{96965028-2F9E-4787-8FE0-280D7A46F03C}" type="datetimeFigureOut">
               <a:rPr lang="fi-FI" smtClean="0"/>
-              <a:t>1.10.2019</a:t>
+              <a:t>21.10.2019</a:t>
             </a:fld>
             <a:endParaRPr lang="fi-FI"/>
           </a:p>
@@ -2404,7 +2404,7 @@
           <a:p>
             <a:fld id="{96965028-2F9E-4787-8FE0-280D7A46F03C}" type="datetimeFigureOut">
               <a:rPr lang="fi-FI" smtClean="0"/>
-              <a:t>1.10.2019</a:t>
+              <a:t>21.10.2019</a:t>
             </a:fld>
             <a:endParaRPr lang="fi-FI"/>
           </a:p>
@@ -2693,7 +2693,7 @@
           <a:p>
             <a:fld id="{96965028-2F9E-4787-8FE0-280D7A46F03C}" type="datetimeFigureOut">
               <a:rPr lang="fi-FI" smtClean="0"/>
-              <a:t>1.10.2019</a:t>
+              <a:t>21.10.2019</a:t>
             </a:fld>
             <a:endParaRPr lang="fi-FI"/>
           </a:p>
@@ -2936,7 +2936,7 @@
           <a:p>
             <a:fld id="{96965028-2F9E-4787-8FE0-280D7A46F03C}" type="datetimeFigureOut">
               <a:rPr lang="fi-FI" smtClean="0"/>
-              <a:t>1.10.2019</a:t>
+              <a:t>21.10.2019</a:t>
             </a:fld>
             <a:endParaRPr lang="fi-FI"/>
           </a:p>
@@ -4304,7 +4304,37 @@
                   <a:schemeClr val="tx1"/>
                 </a:solidFill>
               </a:rPr>
-              <a:t>in case of Full-stack</a:t>
+              <a:t>in case of Full-stack   </a:t>
+            </a:r>
+            <a:r>
+              <a:rPr lang="en-US" dirty="0">
+                <a:solidFill>
+                  <a:schemeClr val="bg1">
+                    <a:lumMod val="50000"/>
+                  </a:schemeClr>
+                </a:solidFill>
+              </a:rPr>
+              <a:t>((((( or </a:t>
+            </a:r>
+            <a:r>
+              <a:rPr lang="en-US" dirty="0" err="1">
+                <a:solidFill>
+                  <a:schemeClr val="bg1">
+                    <a:lumMod val="50000"/>
+                  </a:schemeClr>
+                </a:solidFill>
+              </a:rPr>
+              <a:t>GraphQL</a:t>
+            </a:r>
+            <a:r>
+              <a:rPr lang="en-US" dirty="0">
+                <a:solidFill>
+                  <a:schemeClr val="bg1">
+                    <a:lumMod val="50000"/>
+                  </a:schemeClr>
+                </a:solidFill>
+              </a:rPr>
+              <a:t> backend )))))</a:t>
             </a:r>
           </a:p>
           <a:p>
@@ -4348,7 +4378,7 @@
                   <a:schemeClr val="tx1"/>
                 </a:solidFill>
               </a:rPr>
-              <a:t>as in with databases</a:t>
+              <a:t>as in with database servers</a:t>
             </a:r>
           </a:p>
           <a:p>
@@ -4362,7 +4392,23 @@
                   <a:schemeClr val="tx1"/>
                 </a:solidFill>
               </a:rPr>
-              <a:t>Though often we only have one instance of backend (then could be performance bottleneck)</a:t>
+              <a:t>Though often/mostly we only have one instance of the backend (</a:t>
+            </a:r>
+            <a:r>
+              <a:rPr lang="en-US">
+                <a:solidFill>
+                  <a:schemeClr val="tx1"/>
+                </a:solidFill>
+              </a:rPr>
+              <a:t>then would </a:t>
+            </a:r>
+            <a:r>
+              <a:rPr lang="en-US" dirty="0">
+                <a:solidFill>
+                  <a:schemeClr val="tx1"/>
+                </a:solidFill>
+              </a:rPr>
+              <a:t>be performance bottleneck)</a:t>
             </a:r>
           </a:p>
           <a:p>
@@ -4551,15 +4597,7 @@
                   <a:srgbClr val="FF0000"/>
                 </a:solidFill>
               </a:rPr>
-              <a:t>in the Backend services! Hide the database address </a:t>
-            </a:r>
-            <a:r>
-              <a:rPr lang="en-US">
-                <a:solidFill>
-                  <a:srgbClr val="FF0000"/>
-                </a:solidFill>
-              </a:rPr>
-              <a:t>and username(s)!</a:t>
+              <a:t>in the Backend services! Hide the database address and username(s)!</a:t>
             </a:r>
             <a:endParaRPr lang="en-US" dirty="0">
               <a:solidFill>

</xml_diff>

<commit_message>
Some updates to texts, like DOMAIN, STORED PROCEDURE
</commit_message>
<xml_diff>
--- a/WhatToDoInFrontBackAndDB_usability_performance_security/What to check where in full-stack.pptx
+++ b/WhatToDoInFrontBackAndDB_usability_performance_security/What to check where in full-stack.pptx
@@ -4578,7 +4578,23 @@
                   <a:schemeClr val="tx1"/>
                 </a:solidFill>
               </a:rPr>
-              <a:t>: just “200=ok” or “400=prob” without revealing any internal structures. And for unauthorized or broken requests just: DROP, which means stop handling the request, no response to the client. Good when testing with fake data over and </a:t>
+              <a:t>: just “200=ok” or “400=prob” without revealing any internal structures. And for unauthorized or broken requests just: DROP, which means stop handling the request, no response to the client. Good when testing (with fake data and </a:t>
+            </a:r>
+            <a:r>
+              <a:rPr lang="en-US">
+                <a:solidFill>
+                  <a:schemeClr val="tx1"/>
+                </a:solidFill>
+              </a:rPr>
+              <a:t>test environment) is </a:t>
+            </a:r>
+            <a:r>
+              <a:rPr lang="en-US" dirty="0">
+                <a:solidFill>
+                  <a:schemeClr val="tx1"/>
+                </a:solidFill>
+              </a:rPr>
+              <a:t>over and </a:t>
             </a:r>
             <a:r>
               <a:rPr lang="en-US" b="1" dirty="0">
@@ -5166,21 +5182,8 @@
                   <a:schemeClr val="tx1"/>
                 </a:solidFill>
               </a:rPr>
-              <a:t>Checks of many kind. Basically still re-checking everything, although here usually pre-defined in the </a:t>
-            </a:r>
-            <a:r>
-              <a:rPr lang="en-US">
-                <a:solidFill>
-                  <a:schemeClr val="tx1"/>
-                </a:solidFill>
-              </a:rPr>
-              <a:t>DDL definitions.</a:t>
-            </a:r>
-            <a:endParaRPr lang="en-US" dirty="0">
-              <a:solidFill>
-                <a:schemeClr val="tx1"/>
-              </a:solidFill>
-            </a:endParaRPr>
+              <a:t>Checks of many kind. Basically still re-checking everything, although here usually pre-defined in the DDL definitions.</a:t>
+            </a:r>
           </a:p>
           <a:p>
             <a:pPr marL="285750" indent="-285750">
@@ -5193,7 +5196,7 @@
                   <a:schemeClr val="tx1"/>
                 </a:solidFill>
               </a:rPr>
-              <a:t>PKs, UNIQUEs, NOT NULLs, FKs, CHECK conditions, TRIGGERs</a:t>
+              <a:t>PKs, UNIQUEs, NOT NULLs, FKs, CHECK conditions, DOMAINs, TRIGGERs, STORED PROCEDURES/FUNCTIONS</a:t>
             </a:r>
           </a:p>
           <a:p>
@@ -5316,7 +5319,7 @@
                   <a:srgbClr val="FF0000"/>
                 </a:solidFill>
               </a:rPr>
-              <a:t>RDBMS is really powerful. But do not jam it with problems that can be detected without database. </a:t>
+              <a:t>RDBMS is really powerful. But do not jam it with problems that can be detected without the database. </a:t>
             </a:r>
             <a:endParaRPr lang="en-US" dirty="0">
               <a:solidFill>

</xml_diff>

<commit_message>
Minor edits to the What to do where doc
</commit_message>
<xml_diff>
--- a/WhatToDoInFrontBackAndDB_usability_performance_security/What to check where in full-stack.pptx
+++ b/WhatToDoInFrontBackAndDB_usability_performance_security/What to check where in full-stack.pptx
@@ -267,7 +267,7 @@
           <a:p>
             <a:fld id="{96965028-2F9E-4787-8FE0-280D7A46F03C}" type="datetimeFigureOut">
               <a:rPr lang="fi-FI" smtClean="0"/>
-              <a:t>18.3.2021</a:t>
+              <a:t>11.10.2021</a:t>
             </a:fld>
             <a:endParaRPr lang="fi-FI"/>
           </a:p>
@@ -467,7 +467,7 @@
           <a:p>
             <a:fld id="{96965028-2F9E-4787-8FE0-280D7A46F03C}" type="datetimeFigureOut">
               <a:rPr lang="fi-FI" smtClean="0"/>
-              <a:t>18.3.2021</a:t>
+              <a:t>11.10.2021</a:t>
             </a:fld>
             <a:endParaRPr lang="fi-FI"/>
           </a:p>
@@ -677,7 +677,7 @@
           <a:p>
             <a:fld id="{96965028-2F9E-4787-8FE0-280D7A46F03C}" type="datetimeFigureOut">
               <a:rPr lang="fi-FI" smtClean="0"/>
-              <a:t>18.3.2021</a:t>
+              <a:t>11.10.2021</a:t>
             </a:fld>
             <a:endParaRPr lang="fi-FI"/>
           </a:p>
@@ -877,7 +877,7 @@
           <a:p>
             <a:fld id="{96965028-2F9E-4787-8FE0-280D7A46F03C}" type="datetimeFigureOut">
               <a:rPr lang="fi-FI" smtClean="0"/>
-              <a:t>18.3.2021</a:t>
+              <a:t>11.10.2021</a:t>
             </a:fld>
             <a:endParaRPr lang="fi-FI"/>
           </a:p>
@@ -1153,7 +1153,7 @@
           <a:p>
             <a:fld id="{96965028-2F9E-4787-8FE0-280D7A46F03C}" type="datetimeFigureOut">
               <a:rPr lang="fi-FI" smtClean="0"/>
-              <a:t>18.3.2021</a:t>
+              <a:t>11.10.2021</a:t>
             </a:fld>
             <a:endParaRPr lang="fi-FI"/>
           </a:p>
@@ -1421,7 +1421,7 @@
           <a:p>
             <a:fld id="{96965028-2F9E-4787-8FE0-280D7A46F03C}" type="datetimeFigureOut">
               <a:rPr lang="fi-FI" smtClean="0"/>
-              <a:t>18.3.2021</a:t>
+              <a:t>11.10.2021</a:t>
             </a:fld>
             <a:endParaRPr lang="fi-FI"/>
           </a:p>
@@ -1836,7 +1836,7 @@
           <a:p>
             <a:fld id="{96965028-2F9E-4787-8FE0-280D7A46F03C}" type="datetimeFigureOut">
               <a:rPr lang="fi-FI" smtClean="0"/>
-              <a:t>18.3.2021</a:t>
+              <a:t>11.10.2021</a:t>
             </a:fld>
             <a:endParaRPr lang="fi-FI"/>
           </a:p>
@@ -1978,7 +1978,7 @@
           <a:p>
             <a:fld id="{96965028-2F9E-4787-8FE0-280D7A46F03C}" type="datetimeFigureOut">
               <a:rPr lang="fi-FI" smtClean="0"/>
-              <a:t>18.3.2021</a:t>
+              <a:t>11.10.2021</a:t>
             </a:fld>
             <a:endParaRPr lang="fi-FI"/>
           </a:p>
@@ -2091,7 +2091,7 @@
           <a:p>
             <a:fld id="{96965028-2F9E-4787-8FE0-280D7A46F03C}" type="datetimeFigureOut">
               <a:rPr lang="fi-FI" smtClean="0"/>
-              <a:t>18.3.2021</a:t>
+              <a:t>11.10.2021</a:t>
             </a:fld>
             <a:endParaRPr lang="fi-FI"/>
           </a:p>
@@ -2404,7 +2404,7 @@
           <a:p>
             <a:fld id="{96965028-2F9E-4787-8FE0-280D7A46F03C}" type="datetimeFigureOut">
               <a:rPr lang="fi-FI" smtClean="0"/>
-              <a:t>18.3.2021</a:t>
+              <a:t>11.10.2021</a:t>
             </a:fld>
             <a:endParaRPr lang="fi-FI"/>
           </a:p>
@@ -2693,7 +2693,7 @@
           <a:p>
             <a:fld id="{96965028-2F9E-4787-8FE0-280D7A46F03C}" type="datetimeFigureOut">
               <a:rPr lang="fi-FI" smtClean="0"/>
-              <a:t>18.3.2021</a:t>
+              <a:t>11.10.2021</a:t>
             </a:fld>
             <a:endParaRPr lang="fi-FI"/>
           </a:p>
@@ -2936,7 +2936,7 @@
           <a:p>
             <a:fld id="{96965028-2F9E-4787-8FE0-280D7A46F03C}" type="datetimeFigureOut">
               <a:rPr lang="fi-FI" smtClean="0"/>
-              <a:t>18.3.2021</a:t>
+              <a:t>11.10.2021</a:t>
             </a:fld>
             <a:endParaRPr lang="fi-FI"/>
           </a:p>
@@ -3443,7 +3443,7 @@
           <a:p>
             <a:r>
               <a:rPr lang="en-US" dirty="0"/>
-              <a:t>Version 2021-03-18</a:t>
+              <a:t>Thought-opener,      Version 2021-03-18</a:t>
             </a:r>
             <a:endParaRPr lang="fi-FI" dirty="0"/>
           </a:p>
@@ -4416,7 +4416,23 @@
                   <a:schemeClr val="tx1"/>
                 </a:solidFill>
               </a:rPr>
-              <a:t>Though often/mostly we only have one instance of the backend (then would be performance bottleneck)</a:t>
+              <a:t>Though often/mostly we only have one instance of the backend (then </a:t>
+            </a:r>
+            <a:r>
+              <a:rPr lang="en-US" u="sng" dirty="0">
+                <a:solidFill>
+                  <a:schemeClr val="tx1"/>
+                </a:solidFill>
+              </a:rPr>
+              <a:t>might be</a:t>
+            </a:r>
+            <a:r>
+              <a:rPr lang="en-US" dirty="0">
+                <a:solidFill>
+                  <a:schemeClr val="tx1"/>
+                </a:solidFill>
+              </a:rPr>
+              <a:t> a performance bottleneck)</a:t>
             </a:r>
           </a:p>
           <a:p>
@@ -4476,7 +4492,23 @@
                   <a:schemeClr val="tx1"/>
                 </a:solidFill>
               </a:rPr>
-              <a:t>SECURITY and PERFORMANCE</a:t>
+              <a:t>SECURITY </a:t>
+            </a:r>
+            <a:r>
+              <a:rPr lang="en-US" u="sng" dirty="0">
+                <a:solidFill>
+                  <a:schemeClr val="tx1"/>
+                </a:solidFill>
+              </a:rPr>
+              <a:t>and</a:t>
+            </a:r>
+            <a:r>
+              <a:rPr lang="en-US" dirty="0">
+                <a:solidFill>
+                  <a:schemeClr val="tx1"/>
+                </a:solidFill>
+              </a:rPr>
+              <a:t> PERFORMANCE</a:t>
             </a:r>
           </a:p>
           <a:p>
@@ -4578,23 +4610,7 @@
                   <a:schemeClr val="tx1"/>
                 </a:solidFill>
               </a:rPr>
-              <a:t>: just “200=ok” or “400=prob” without revealing any internal structures. And for unauthorized or broken requests just: DROP, which means stop handling the request, no response to the client. Good when testing (with fake data and </a:t>
-            </a:r>
-            <a:r>
-              <a:rPr lang="en-US">
-                <a:solidFill>
-                  <a:schemeClr val="tx1"/>
-                </a:solidFill>
-              </a:rPr>
-              <a:t>test environment) is </a:t>
-            </a:r>
-            <a:r>
-              <a:rPr lang="en-US" dirty="0">
-                <a:solidFill>
-                  <a:schemeClr val="tx1"/>
-                </a:solidFill>
-              </a:rPr>
-              <a:t>over and </a:t>
+              <a:t>: just “200=ok” or “400=prob” without revealing any internal structures. And for unauthorized or broken requests just: DROP, which means stop handling the request, no response to the client. Good when testing (with fake data and test environment) is over and </a:t>
             </a:r>
             <a:r>
               <a:rPr lang="en-US" b="1" dirty="0">
@@ -4902,7 +4918,23 @@
                   <a:schemeClr val="tx1"/>
                 </a:solidFill>
               </a:rPr>
-              <a:t>We use SSH tunnel here for encryption/protection</a:t>
+              <a:t>We use SSH tunnel/</a:t>
+            </a:r>
+            <a:r>
+              <a:rPr lang="en-US" sz="3200" dirty="0" err="1">
+                <a:solidFill>
+                  <a:schemeClr val="tx1"/>
+                </a:solidFill>
+              </a:rPr>
+              <a:t>portforwarding</a:t>
+            </a:r>
+            <a:r>
+              <a:rPr lang="en-US" sz="3200" dirty="0">
+                <a:solidFill>
+                  <a:schemeClr val="tx1"/>
+                </a:solidFill>
+              </a:rPr>
+              <a:t> here for encryption/protection and decoupling</a:t>
             </a:r>
           </a:p>
           <a:p>
@@ -5314,12 +5346,36 @@
               <a:buChar char="•"/>
             </a:pPr>
             <a:r>
+              <a:rPr lang="en-US" b="1" dirty="0" err="1">
+                <a:solidFill>
+                  <a:srgbClr val="FF0000"/>
+                </a:solidFill>
+              </a:rPr>
+              <a:t>RDBMSes</a:t>
+            </a:r>
+            <a:r>
               <a:rPr lang="en-US" b="1" dirty="0">
                 <a:solidFill>
                   <a:srgbClr val="FF0000"/>
                 </a:solidFill>
               </a:rPr>
-              <a:t>RDBMS is really powerful. But do not jam it with problems that can be detected without the database. </a:t>
+              <a:t> are really powerful. But do not </a:t>
+            </a:r>
+            <a:r>
+              <a:rPr lang="en-US" b="1">
+                <a:solidFill>
+                  <a:srgbClr val="FF0000"/>
+                </a:solidFill>
+              </a:rPr>
+              <a:t>jam DBMS </a:t>
+            </a:r>
+            <a:r>
+              <a:rPr lang="en-US" b="1" dirty="0">
+                <a:solidFill>
+                  <a:srgbClr val="FF0000"/>
+                </a:solidFill>
+              </a:rPr>
+              <a:t>with problems that can be detected without the database. </a:t>
             </a:r>
             <a:endParaRPr lang="en-US" dirty="0">
               <a:solidFill>

</xml_diff>